<commit_message>
fix VG chapters (microvg 1.3)
</commit_message>
<xml_diff>
--- a/VEEPortingGuide/images/java-c-vg-interface.pptx
+++ b/VEEPortingGuide/images/java-c-vg-interface.pptx
@@ -261,7 +261,7 @@
           <a:p>
             <a:fld id="{4E285625-C24A-4341-90BC-6CD71F835625}" type="datetimeFigureOut">
               <a:rPr lang="en-GB" smtClean="0"/>
-              <a:t>31/08/2022</a:t>
+              <a:t>02/06/2023</a:t>
             </a:fld>
             <a:endParaRPr lang="en-GB"/>
           </a:p>
@@ -461,7 +461,7 @@
           <a:p>
             <a:fld id="{4E285625-C24A-4341-90BC-6CD71F835625}" type="datetimeFigureOut">
               <a:rPr lang="en-GB" smtClean="0"/>
-              <a:t>31/08/2022</a:t>
+              <a:t>02/06/2023</a:t>
             </a:fld>
             <a:endParaRPr lang="en-GB"/>
           </a:p>
@@ -671,7 +671,7 @@
           <a:p>
             <a:fld id="{4E285625-C24A-4341-90BC-6CD71F835625}" type="datetimeFigureOut">
               <a:rPr lang="en-GB" smtClean="0"/>
-              <a:t>31/08/2022</a:t>
+              <a:t>02/06/2023</a:t>
             </a:fld>
             <a:endParaRPr lang="en-GB"/>
           </a:p>
@@ -871,7 +871,7 @@
           <a:p>
             <a:fld id="{4E285625-C24A-4341-90BC-6CD71F835625}" type="datetimeFigureOut">
               <a:rPr lang="en-GB" smtClean="0"/>
-              <a:t>31/08/2022</a:t>
+              <a:t>02/06/2023</a:t>
             </a:fld>
             <a:endParaRPr lang="en-GB"/>
           </a:p>
@@ -1147,7 +1147,7 @@
           <a:p>
             <a:fld id="{4E285625-C24A-4341-90BC-6CD71F835625}" type="datetimeFigureOut">
               <a:rPr lang="en-GB" smtClean="0"/>
-              <a:t>31/08/2022</a:t>
+              <a:t>02/06/2023</a:t>
             </a:fld>
             <a:endParaRPr lang="en-GB"/>
           </a:p>
@@ -1415,7 +1415,7 @@
           <a:p>
             <a:fld id="{4E285625-C24A-4341-90BC-6CD71F835625}" type="datetimeFigureOut">
               <a:rPr lang="en-GB" smtClean="0"/>
-              <a:t>31/08/2022</a:t>
+              <a:t>02/06/2023</a:t>
             </a:fld>
             <a:endParaRPr lang="en-GB"/>
           </a:p>
@@ -1830,7 +1830,7 @@
           <a:p>
             <a:fld id="{4E285625-C24A-4341-90BC-6CD71F835625}" type="datetimeFigureOut">
               <a:rPr lang="en-GB" smtClean="0"/>
-              <a:t>31/08/2022</a:t>
+              <a:t>02/06/2023</a:t>
             </a:fld>
             <a:endParaRPr lang="en-GB"/>
           </a:p>
@@ -1972,7 +1972,7 @@
           <a:p>
             <a:fld id="{4E285625-C24A-4341-90BC-6CD71F835625}" type="datetimeFigureOut">
               <a:rPr lang="en-GB" smtClean="0"/>
-              <a:t>31/08/2022</a:t>
+              <a:t>02/06/2023</a:t>
             </a:fld>
             <a:endParaRPr lang="en-GB"/>
           </a:p>
@@ -2085,7 +2085,7 @@
           <a:p>
             <a:fld id="{4E285625-C24A-4341-90BC-6CD71F835625}" type="datetimeFigureOut">
               <a:rPr lang="en-GB" smtClean="0"/>
-              <a:t>31/08/2022</a:t>
+              <a:t>02/06/2023</a:t>
             </a:fld>
             <a:endParaRPr lang="en-GB"/>
           </a:p>
@@ -2398,7 +2398,7 @@
           <a:p>
             <a:fld id="{4E285625-C24A-4341-90BC-6CD71F835625}" type="datetimeFigureOut">
               <a:rPr lang="en-GB" smtClean="0"/>
-              <a:t>31/08/2022</a:t>
+              <a:t>02/06/2023</a:t>
             </a:fld>
             <a:endParaRPr lang="en-GB"/>
           </a:p>
@@ -2687,7 +2687,7 @@
           <a:p>
             <a:fld id="{4E285625-C24A-4341-90BC-6CD71F835625}" type="datetimeFigureOut">
               <a:rPr lang="en-GB" smtClean="0"/>
-              <a:t>31/08/2022</a:t>
+              <a:t>02/06/2023</a:t>
             </a:fld>
             <a:endParaRPr lang="en-GB"/>
           </a:p>
@@ -2930,7 +2930,7 @@
           <a:p>
             <a:fld id="{4E285625-C24A-4341-90BC-6CD71F835625}" type="datetimeFigureOut">
               <a:rPr lang="en-GB" smtClean="0"/>
-              <a:t>31/08/2022</a:t>
+              <a:t>02/06/2023</a:t>
             </a:fld>
             <a:endParaRPr lang="en-GB"/>
           </a:p>
@@ -3434,8 +3434,8 @@
         </p:nvSpPr>
         <p:spPr>
           <a:xfrm>
-            <a:off x="2015635" y="2245298"/>
-            <a:ext cx="2372238" cy="1759012"/>
+            <a:off x="1660473" y="2245298"/>
+            <a:ext cx="2727399" cy="1759012"/>
           </a:xfrm>
           <a:prstGeom prst="roundRect">
             <a:avLst>
@@ -3507,8 +3507,8 @@
         </p:nvSpPr>
         <p:spPr>
           <a:xfrm>
-            <a:off x="2016434" y="1040768"/>
-            <a:ext cx="4320000" cy="324000"/>
+            <a:off x="1660473" y="1040768"/>
+            <a:ext cx="4675961" cy="324000"/>
           </a:xfrm>
           <a:prstGeom prst="roundRect">
             <a:avLst>
@@ -3598,8 +3598,8 @@
         </p:nvSpPr>
         <p:spPr>
           <a:xfrm>
-            <a:off x="2015635" y="1639761"/>
-            <a:ext cx="4320000" cy="324000"/>
+            <a:off x="1660473" y="1639761"/>
+            <a:ext cx="4675162" cy="324000"/>
           </a:xfrm>
           <a:prstGeom prst="roundRect">
             <a:avLst>
@@ -3689,7 +3689,7 @@
         </p:nvSpPr>
         <p:spPr>
           <a:xfrm>
-            <a:off x="2126942" y="2352674"/>
+            <a:off x="1745442" y="2351593"/>
             <a:ext cx="432000" cy="324000"/>
           </a:xfrm>
           <a:prstGeom prst="roundRect">
@@ -3814,8 +3814,8 @@
         </p:nvSpPr>
         <p:spPr>
           <a:xfrm>
-            <a:off x="2122806" y="2957130"/>
-            <a:ext cx="2052825" cy="401484"/>
+            <a:off x="1752642" y="2957130"/>
+            <a:ext cx="2492839" cy="401484"/>
           </a:xfrm>
           <a:prstGeom prst="roundRect">
             <a:avLst>
@@ -4002,8 +4002,8 @@
         </p:nvGrpSpPr>
         <p:grpSpPr>
           <a:xfrm>
-            <a:off x="2122806" y="3642867"/>
-            <a:ext cx="2038651" cy="389240"/>
+            <a:off x="1752642" y="3642867"/>
+            <a:ext cx="2478665" cy="389240"/>
             <a:chOff x="2447475" y="5013345"/>
             <a:chExt cx="2989409" cy="389240"/>
           </a:xfrm>
@@ -4262,8 +4262,8 @@
         </p:nvCxnSpPr>
         <p:spPr>
           <a:xfrm flipV="1">
-            <a:off x="4175635" y="1364768"/>
-            <a:ext cx="799" cy="274993"/>
+            <a:off x="3998054" y="1364768"/>
+            <a:ext cx="400" cy="274993"/>
           </a:xfrm>
           <a:prstGeom prst="line">
             <a:avLst/>
@@ -4300,8 +4300,8 @@
         </p:nvCxnSpPr>
         <p:spPr>
           <a:xfrm flipV="1">
-            <a:off x="2342942" y="1963761"/>
-            <a:ext cx="0" cy="388913"/>
+            <a:off x="1961442" y="1963761"/>
+            <a:ext cx="0" cy="387832"/>
           </a:xfrm>
           <a:prstGeom prst="line">
             <a:avLst/>
@@ -4337,8 +4337,8 @@
         </p:nvCxnSpPr>
         <p:spPr>
           <a:xfrm flipV="1">
-            <a:off x="2881783" y="1960489"/>
-            <a:ext cx="0" cy="392185"/>
+            <a:off x="2478410" y="1968951"/>
+            <a:ext cx="0" cy="382642"/>
           </a:xfrm>
           <a:prstGeom prst="line">
             <a:avLst/>
@@ -4374,9 +4374,9 @@
           <p:nvPr/>
         </p:nvCxnSpPr>
         <p:spPr>
-          <a:xfrm flipV="1">
-            <a:off x="3420624" y="1960491"/>
-            <a:ext cx="0" cy="392183"/>
+          <a:xfrm flipH="1" flipV="1">
+            <a:off x="2988202" y="1960489"/>
+            <a:ext cx="7176" cy="391104"/>
           </a:xfrm>
           <a:prstGeom prst="line">
             <a:avLst/>
@@ -4451,8 +4451,8 @@
         </p:nvCxnSpPr>
         <p:spPr>
           <a:xfrm flipH="1" flipV="1">
-            <a:off x="2342942" y="2676674"/>
-            <a:ext cx="7200" cy="280456"/>
+            <a:off x="1961442" y="2675593"/>
+            <a:ext cx="7200" cy="281537"/>
           </a:xfrm>
           <a:prstGeom prst="line">
             <a:avLst/>
@@ -4488,8 +4488,8 @@
         </p:nvCxnSpPr>
         <p:spPr>
           <a:xfrm flipV="1">
-            <a:off x="2881783" y="2676674"/>
-            <a:ext cx="0" cy="280456"/>
+            <a:off x="2478410" y="2675593"/>
+            <a:ext cx="0" cy="265240"/>
           </a:xfrm>
           <a:prstGeom prst="line">
             <a:avLst/>
@@ -4527,8 +4527,8 @@
         </p:nvCxnSpPr>
         <p:spPr>
           <a:xfrm flipV="1">
-            <a:off x="3139477" y="3358614"/>
-            <a:ext cx="9742" cy="284253"/>
+            <a:off x="2988747" y="3358614"/>
+            <a:ext cx="10315" cy="284253"/>
           </a:xfrm>
           <a:prstGeom prst="line">
             <a:avLst/>
@@ -4564,9 +4564,9 @@
           <p:nvPr/>
         </p:nvCxnSpPr>
         <p:spPr>
-          <a:xfrm flipV="1">
-            <a:off x="3420624" y="2676674"/>
-            <a:ext cx="0" cy="280456"/>
+          <a:xfrm flipH="1" flipV="1">
+            <a:off x="2995378" y="2675593"/>
+            <a:ext cx="7199" cy="284253"/>
           </a:xfrm>
           <a:prstGeom prst="line">
             <a:avLst/>
@@ -4704,7 +4704,7 @@
         <p:spPr>
           <a:xfrm>
             <a:off x="3931199" y="4101435"/>
-            <a:ext cx="1548455" cy="276999"/>
+            <a:ext cx="2372238" cy="276999"/>
           </a:xfrm>
           <a:prstGeom prst="rect">
             <a:avLst/>
@@ -4743,7 +4743,7 @@
                 <a:ea typeface="Source Sans Pro Light" charset="0"/>
                 <a:cs typeface="Source Sans Pro Light" charset="0"/>
               </a:rPr>
-              <a:t>Provided by platform</a:t>
+              <a:t>Provided by the VEE Port</a:t>
             </a:r>
             <a:endParaRPr kumimoji="0" lang="en-US" sz="1200" b="0" i="0" u="none" strike="noStrike" kern="0" cap="none" spc="0" normalizeH="0" baseline="0" noProof="0" dirty="0">
               <a:ln>
@@ -4776,8 +4776,8 @@
         </p:nvSpPr>
         <p:spPr>
           <a:xfrm>
-            <a:off x="3308991" y="2018081"/>
-            <a:ext cx="776204" cy="261610"/>
+            <a:off x="3475535" y="2009085"/>
+            <a:ext cx="1077683" cy="261610"/>
           </a:xfrm>
           <a:prstGeom prst="rect">
             <a:avLst/>
@@ -4822,7 +4822,7 @@
                 <a:ea typeface="Source Sans Pro Light" charset="0"/>
                 <a:cs typeface="Source Sans Pro Light" charset="0"/>
               </a:rPr>
-              <a:t>Platform</a:t>
+              <a:t>Embedded</a:t>
             </a:r>
           </a:p>
         </p:txBody>
@@ -5239,7 +5239,7 @@
         </p:nvSpPr>
         <p:spPr>
           <a:xfrm>
-            <a:off x="2665783" y="2352674"/>
+            <a:off x="2262410" y="2351593"/>
             <a:ext cx="432000" cy="324000"/>
           </a:xfrm>
           <a:prstGeom prst="roundRect">
@@ -5290,7 +5290,7 @@
         </p:nvSpPr>
         <p:spPr>
           <a:xfrm>
-            <a:off x="3204624" y="2352674"/>
+            <a:off x="2779378" y="2351593"/>
             <a:ext cx="432000" cy="324000"/>
           </a:xfrm>
           <a:prstGeom prst="roundRect">
@@ -5380,7 +5380,7 @@
         </p:nvSpPr>
         <p:spPr>
           <a:xfrm>
-            <a:off x="3743465" y="2351593"/>
+            <a:off x="3813315" y="2351593"/>
             <a:ext cx="432000" cy="324000"/>
           </a:xfrm>
           <a:prstGeom prst="roundRect">
@@ -5429,14 +5429,13 @@
           <p:cNvCxnSpPr>
             <a:cxnSpLocks/>
             <a:stCxn id="4" idx="0"/>
-            <a:endCxn id="7" idx="2"/>
           </p:cNvCxnSpPr>
           <p:nvPr/>
         </p:nvCxnSpPr>
         <p:spPr>
           <a:xfrm flipV="1">
-            <a:off x="3959465" y="1963761"/>
-            <a:ext cx="0" cy="387832"/>
+            <a:off x="4029315" y="1933276"/>
+            <a:ext cx="0" cy="418317"/>
           </a:xfrm>
           <a:prstGeom prst="line">
             <a:avLst/>
@@ -5472,8 +5471,133 @@
         </p:nvCxnSpPr>
         <p:spPr>
           <a:xfrm flipV="1">
-            <a:off x="3959465" y="2675593"/>
+            <a:off x="4029315" y="2675593"/>
             <a:ext cx="0" cy="281537"/>
+          </a:xfrm>
+          <a:prstGeom prst="line">
+            <a:avLst/>
+          </a:prstGeom>
+          <a:noFill/>
+          <a:ln w="28575" cap="flat" cmpd="sng" algn="ctr">
+            <a:solidFill>
+              <a:srgbClr val="717D83">
+                <a:lumMod val="60000"/>
+                <a:lumOff val="40000"/>
+              </a:srgbClr>
+            </a:solidFill>
+            <a:prstDash val="solid"/>
+            <a:headEnd type="triangle"/>
+          </a:ln>
+          <a:effectLst/>
+        </p:spPr>
+      </p:cxnSp>
+      <p:sp>
+        <p:nvSpPr>
+          <p:cNvPr id="2" name="Rounded Rectangle 55">
+            <a:extLst>
+              <a:ext uri="{FF2B5EF4-FFF2-40B4-BE49-F238E27FC236}">
+                <a16:creationId xmlns:a16="http://schemas.microsoft.com/office/drawing/2014/main" id="{25B3A8E0-87C1-63CA-69A8-CEC82841A63B}"/>
+              </a:ext>
+            </a:extLst>
+          </p:cNvPr>
+          <p:cNvSpPr/>
+          <p:nvPr/>
+        </p:nvSpPr>
+        <p:spPr>
+          <a:xfrm>
+            <a:off x="3296346" y="2351593"/>
+            <a:ext cx="432000" cy="324000"/>
+          </a:xfrm>
+          <a:prstGeom prst="roundRect">
+            <a:avLst>
+              <a:gd name="adj" fmla="val 19644"/>
+            </a:avLst>
+          </a:prstGeom>
+          <a:solidFill>
+            <a:srgbClr val="EE502E"/>
+          </a:solidFill>
+          <a:ln w="12700" cap="flat" cmpd="sng" algn="ctr">
+            <a:noFill/>
+            <a:prstDash val="solid"/>
+          </a:ln>
+          <a:effectLst/>
+        </p:spPr>
+        <p:txBody>
+          <a:bodyPr wrap="square" lIns="0" tIns="36000" rIns="0" bIns="36000" rtlCol="0" anchor="ctr">
+            <a:noAutofit/>
+          </a:bodyPr>
+          <a:lstStyle/>
+          <a:p>
+            <a:pPr algn="ctr" defTabSz="914377"/>
+            <a:r>
+              <a:rPr lang="en-US" sz="1200" b="1" kern="0" dirty="0">
+                <a:solidFill>
+                  <a:srgbClr val="FFFFFF"/>
+                </a:solidFill>
+                <a:latin typeface="Source Sans Pro Light" charset="0"/>
+                <a:ea typeface="Source Sans Pro Light" charset="0"/>
+              </a:rPr>
+              <a:t>Image</a:t>
+            </a:r>
+          </a:p>
+        </p:txBody>
+      </p:sp>
+      <p:cxnSp>
+        <p:nvCxnSpPr>
+          <p:cNvPr id="3" name="Straight Connector 2">
+            <a:extLst>
+              <a:ext uri="{FF2B5EF4-FFF2-40B4-BE49-F238E27FC236}">
+                <a16:creationId xmlns:a16="http://schemas.microsoft.com/office/drawing/2014/main" id="{86B4C3D2-661D-81EC-E797-33DAB54596FB}"/>
+              </a:ext>
+            </a:extLst>
+          </p:cNvPr>
+          <p:cNvCxnSpPr>
+            <a:cxnSpLocks/>
+            <a:stCxn id="2" idx="0"/>
+          </p:cNvCxnSpPr>
+          <p:nvPr/>
+        </p:nvCxnSpPr>
+        <p:spPr>
+          <a:xfrm flipV="1">
+            <a:off x="3512346" y="1960489"/>
+            <a:ext cx="7176" cy="391104"/>
+          </a:xfrm>
+          <a:prstGeom prst="line">
+            <a:avLst/>
+          </a:prstGeom>
+          <a:noFill/>
+          <a:ln w="28575" cap="flat" cmpd="sng" algn="ctr">
+            <a:solidFill>
+              <a:srgbClr val="717D83">
+                <a:lumMod val="60000"/>
+                <a:lumOff val="40000"/>
+              </a:srgbClr>
+            </a:solidFill>
+            <a:prstDash val="solid"/>
+            <a:headEnd type="triangle"/>
+          </a:ln>
+          <a:effectLst/>
+        </p:spPr>
+      </p:cxnSp>
+      <p:cxnSp>
+        <p:nvCxnSpPr>
+          <p:cNvPr id="6" name="Straight Connector 5">
+            <a:extLst>
+              <a:ext uri="{FF2B5EF4-FFF2-40B4-BE49-F238E27FC236}">
+                <a16:creationId xmlns:a16="http://schemas.microsoft.com/office/drawing/2014/main" id="{2A953890-31BE-A177-2C2D-520C8FDA78E2}"/>
+              </a:ext>
+            </a:extLst>
+          </p:cNvPr>
+          <p:cNvCxnSpPr>
+            <a:cxnSpLocks/>
+            <a:endCxn id="2" idx="2"/>
+          </p:cNvCxnSpPr>
+          <p:nvPr/>
+        </p:nvCxnSpPr>
+        <p:spPr>
+          <a:xfrm flipV="1">
+            <a:off x="3512346" y="2675593"/>
+            <a:ext cx="0" cy="284253"/>
           </a:xfrm>
           <a:prstGeom prst="line">
             <a:avLst/>

</xml_diff>